<commit_message>
Research roles in a company and their responsibilities
</commit_message>
<xml_diff>
--- a/[Week 5] Database Dashboard/Presentation/Powerpoint.pptx
+++ b/[Week 5] Database Dashboard/Presentation/Powerpoint.pptx
@@ -7,7 +7,7 @@
   <p:sldIdLst>
     <p:sldId id="256" r:id="rId2"/>
     <p:sldId id="257" r:id="rId3"/>
-    <p:sldId id="273" r:id="rId4"/>
+    <p:sldId id="258" r:id="rId4"/>
     <p:sldId id="259" r:id="rId5"/>
     <p:sldId id="260" r:id="rId6"/>
     <p:sldId id="261" r:id="rId7"/>
@@ -352,7 +352,7 @@
             <a:fld id="{1D8BD707-D9CF-40AE-B4C6-C98DA3205C09}" type="datetimeFigureOut">
               <a:rPr lang="en-US" smtClean="0"/>
               <a:pPr/>
-              <a:t>5/15/2024</a:t>
+              <a:t>5/20/2024</a:t>
             </a:fld>
             <a:endParaRPr lang="en-US"/>
           </a:p>
@@ -517,7 +517,7 @@
             <a:fld id="{1D8BD707-D9CF-40AE-B4C6-C98DA3205C09}" type="datetimeFigureOut">
               <a:rPr lang="en-US" smtClean="0"/>
               <a:pPr/>
-              <a:t>5/15/2024</a:t>
+              <a:t>5/20/2024</a:t>
             </a:fld>
             <a:endParaRPr lang="en-US"/>
           </a:p>
@@ -692,7 +692,7 @@
             <a:fld id="{1D8BD707-D9CF-40AE-B4C6-C98DA3205C09}" type="datetimeFigureOut">
               <a:rPr lang="en-US" smtClean="0"/>
               <a:pPr/>
-              <a:t>5/15/2024</a:t>
+              <a:t>5/20/2024</a:t>
             </a:fld>
             <a:endParaRPr lang="en-US"/>
           </a:p>
@@ -857,7 +857,7 @@
             <a:fld id="{1D8BD707-D9CF-40AE-B4C6-C98DA3205C09}" type="datetimeFigureOut">
               <a:rPr lang="en-US" smtClean="0"/>
               <a:pPr/>
-              <a:t>5/15/2024</a:t>
+              <a:t>5/20/2024</a:t>
             </a:fld>
             <a:endParaRPr lang="en-US"/>
           </a:p>
@@ -1099,7 +1099,7 @@
             <a:fld id="{1D8BD707-D9CF-40AE-B4C6-C98DA3205C09}" type="datetimeFigureOut">
               <a:rPr lang="en-US" smtClean="0"/>
               <a:pPr/>
-              <a:t>5/15/2024</a:t>
+              <a:t>5/20/2024</a:t>
             </a:fld>
             <a:endParaRPr lang="en-US"/>
           </a:p>
@@ -1381,7 +1381,7 @@
             <a:fld id="{1D8BD707-D9CF-40AE-B4C6-C98DA3205C09}" type="datetimeFigureOut">
               <a:rPr lang="en-US" smtClean="0"/>
               <a:pPr/>
-              <a:t>5/15/2024</a:t>
+              <a:t>5/20/2024</a:t>
             </a:fld>
             <a:endParaRPr lang="en-US"/>
           </a:p>
@@ -1797,7 +1797,7 @@
             <a:fld id="{1D8BD707-D9CF-40AE-B4C6-C98DA3205C09}" type="datetimeFigureOut">
               <a:rPr lang="en-US" smtClean="0"/>
               <a:pPr/>
-              <a:t>5/15/2024</a:t>
+              <a:t>5/20/2024</a:t>
             </a:fld>
             <a:endParaRPr lang="en-US"/>
           </a:p>
@@ -1911,7 +1911,7 @@
             <a:fld id="{1D8BD707-D9CF-40AE-B4C6-C98DA3205C09}" type="datetimeFigureOut">
               <a:rPr lang="en-US" smtClean="0"/>
               <a:pPr/>
-              <a:t>5/15/2024</a:t>
+              <a:t>5/20/2024</a:t>
             </a:fld>
             <a:endParaRPr lang="en-US"/>
           </a:p>
@@ -2003,7 +2003,7 @@
             <a:fld id="{1D8BD707-D9CF-40AE-B4C6-C98DA3205C09}" type="datetimeFigureOut">
               <a:rPr lang="en-US" smtClean="0"/>
               <a:pPr/>
-              <a:t>5/15/2024</a:t>
+              <a:t>5/20/2024</a:t>
             </a:fld>
             <a:endParaRPr lang="en-US"/>
           </a:p>
@@ -2275,7 +2275,7 @@
             <a:fld id="{1D8BD707-D9CF-40AE-B4C6-C98DA3205C09}" type="datetimeFigureOut">
               <a:rPr lang="en-US" smtClean="0"/>
               <a:pPr/>
-              <a:t>5/15/2024</a:t>
+              <a:t>5/20/2024</a:t>
             </a:fld>
             <a:endParaRPr lang="en-US"/>
           </a:p>
@@ -2524,7 +2524,7 @@
             <a:fld id="{1D8BD707-D9CF-40AE-B4C6-C98DA3205C09}" type="datetimeFigureOut">
               <a:rPr lang="en-US" smtClean="0"/>
               <a:pPr/>
-              <a:t>5/15/2024</a:t>
+              <a:t>5/20/2024</a:t>
             </a:fld>
             <a:endParaRPr lang="en-US"/>
           </a:p>
@@ -2732,7 +2732,7 @@
             <a:fld id="{1D8BD707-D9CF-40AE-B4C6-C98DA3205C09}" type="datetimeFigureOut">
               <a:rPr lang="en-US" smtClean="0"/>
               <a:pPr/>
-              <a:t>5/15/2024</a:t>
+              <a:t>5/20/2024</a:t>
             </a:fld>
             <a:endParaRPr lang="en-US"/>
           </a:p>
@@ -4374,8 +4374,8 @@
         </p:nvSpPr>
         <p:spPr>
           <a:xfrm>
-            <a:off x="3502065" y="346916"/>
-            <a:ext cx="11283869" cy="9593168"/>
+            <a:off x="3696988" y="193946"/>
+            <a:ext cx="11204895" cy="9899108"/>
           </a:xfrm>
           <a:custGeom>
             <a:avLst/>
@@ -4384,18 +4384,18 @@
             <a:cxnLst/>
             <a:rect l="l" t="t" r="r" b="b"/>
             <a:pathLst>
-              <a:path w="11283869" h="9593168">
+              <a:path w="11204895" h="9899108">
                 <a:moveTo>
                   <a:pt x="0" y="0"/>
                 </a:moveTo>
                 <a:lnTo>
-                  <a:pt x="11283870" y="0"/>
+                  <a:pt x="11204895" y="0"/>
                 </a:lnTo>
                 <a:lnTo>
-                  <a:pt x="11283870" y="9593168"/>
+                  <a:pt x="11204895" y="9899108"/>
                 </a:lnTo>
                 <a:lnTo>
-                  <a:pt x="0" y="9593168"/>
+                  <a:pt x="0" y="9899108"/>
                 </a:lnTo>
                 <a:lnTo>
                   <a:pt x="0" y="0"/>
@@ -4696,8 +4696,8 @@
         </p:nvSpPr>
         <p:spPr>
           <a:xfrm>
-            <a:off x="3859988" y="2168080"/>
-            <a:ext cx="10568024" cy="7478170"/>
+            <a:off x="4086389" y="2182687"/>
+            <a:ext cx="10115221" cy="7589326"/>
           </a:xfrm>
           <a:custGeom>
             <a:avLst/>
@@ -4706,18 +4706,18 @@
             <a:cxnLst/>
             <a:rect l="l" t="t" r="r" b="b"/>
             <a:pathLst>
-              <a:path w="10568024" h="7478170">
+              <a:path w="10115221" h="7589326">
                 <a:moveTo>
                   <a:pt x="0" y="0"/>
                 </a:moveTo>
                 <a:lnTo>
-                  <a:pt x="10568024" y="0"/>
+                  <a:pt x="10115222" y="0"/>
                 </a:lnTo>
                 <a:lnTo>
-                  <a:pt x="10568024" y="7478170"/>
+                  <a:pt x="10115222" y="7589326"/>
                 </a:lnTo>
                 <a:lnTo>
-                  <a:pt x="0" y="7478170"/>
+                  <a:pt x="0" y="7589326"/>
                 </a:lnTo>
                 <a:lnTo>
                   <a:pt x="0" y="0"/>
@@ -4805,8 +4805,8 @@
         </p:nvSpPr>
         <p:spPr>
           <a:xfrm>
-            <a:off x="4217778" y="2059319"/>
-            <a:ext cx="9852444" cy="7764085"/>
+            <a:off x="4597203" y="2184458"/>
+            <a:ext cx="9093595" cy="7520840"/>
           </a:xfrm>
           <a:custGeom>
             <a:avLst/>
@@ -4815,18 +4815,18 @@
             <a:cxnLst/>
             <a:rect l="l" t="t" r="r" b="b"/>
             <a:pathLst>
-              <a:path w="9852444" h="7764085">
+              <a:path w="9093595" h="7520840">
                 <a:moveTo>
                   <a:pt x="0" y="0"/>
                 </a:moveTo>
                 <a:lnTo>
-                  <a:pt x="9852444" y="0"/>
+                  <a:pt x="9093594" y="0"/>
                 </a:lnTo>
                 <a:lnTo>
-                  <a:pt x="9852444" y="7764085"/>
+                  <a:pt x="9093594" y="7520841"/>
                 </a:lnTo>
                 <a:lnTo>
-                  <a:pt x="0" y="7764085"/>
+                  <a:pt x="0" y="7520841"/>
                 </a:lnTo>
                 <a:lnTo>
                   <a:pt x="0" y="0"/>
@@ -4914,8 +4914,8 @@
         </p:nvSpPr>
         <p:spPr>
           <a:xfrm>
-            <a:off x="3129047" y="1930142"/>
-            <a:ext cx="12029905" cy="7684914"/>
+            <a:off x="3786493" y="2303698"/>
+            <a:ext cx="11040347" cy="7052766"/>
           </a:xfrm>
           <a:custGeom>
             <a:avLst/>
@@ -4924,18 +4924,18 @@
             <a:cxnLst/>
             <a:rect l="l" t="t" r="r" b="b"/>
             <a:pathLst>
-              <a:path w="12029905" h="7684914">
+              <a:path w="11040347" h="7052766">
                 <a:moveTo>
                   <a:pt x="0" y="0"/>
                 </a:moveTo>
                 <a:lnTo>
-                  <a:pt x="12029906" y="0"/>
+                  <a:pt x="11040347" y="0"/>
                 </a:lnTo>
                 <a:lnTo>
-                  <a:pt x="12029906" y="7684914"/>
+                  <a:pt x="11040347" y="7052766"/>
                 </a:lnTo>
                 <a:lnTo>
-                  <a:pt x="0" y="7684914"/>
+                  <a:pt x="0" y="7052766"/>
                 </a:lnTo>
                 <a:lnTo>
                   <a:pt x="0" y="0"/>
@@ -5023,8 +5023,8 @@
         </p:nvSpPr>
         <p:spPr>
           <a:xfrm>
-            <a:off x="4074883" y="2198803"/>
-            <a:ext cx="10138234" cy="6949391"/>
+            <a:off x="4135801" y="2266904"/>
+            <a:ext cx="10016398" cy="6991396"/>
           </a:xfrm>
           <a:custGeom>
             <a:avLst/>
@@ -5033,18 +5033,18 @@
             <a:cxnLst/>
             <a:rect l="l" t="t" r="r" b="b"/>
             <a:pathLst>
-              <a:path w="10138234" h="6949391">
+              <a:path w="10016398" h="6991396">
                 <a:moveTo>
                   <a:pt x="0" y="0"/>
                 </a:moveTo>
                 <a:lnTo>
-                  <a:pt x="10138234" y="0"/>
+                  <a:pt x="10016398" y="0"/>
                 </a:lnTo>
                 <a:lnTo>
-                  <a:pt x="10138234" y="6949391"/>
+                  <a:pt x="10016398" y="6991396"/>
                 </a:lnTo>
                 <a:lnTo>
-                  <a:pt x="0" y="6949391"/>
+                  <a:pt x="0" y="6991396"/>
                 </a:lnTo>
                 <a:lnTo>
                   <a:pt x="0" y="0"/>
@@ -5530,6 +5530,44 @@
           </a:p>
         </p:txBody>
       </p:sp>
+      <p:sp>
+        <p:nvSpPr>
+          <p:cNvPr id="12" name="TextBox 12"/>
+          <p:cNvSpPr txBox="1"/>
+          <p:nvPr/>
+        </p:nvSpPr>
+        <p:spPr>
+          <a:xfrm>
+            <a:off x="6479069" y="8906263"/>
+            <a:ext cx="5329863" cy="306705"/>
+          </a:xfrm>
+          <a:prstGeom prst="rect">
+            <a:avLst/>
+          </a:prstGeom>
+        </p:spPr>
+        <p:txBody>
+          <a:bodyPr lIns="0" tIns="0" rIns="0" bIns="0" rtlCol="0" anchor="t">
+            <a:spAutoFit/>
+          </a:bodyPr>
+          <a:lstStyle/>
+          <a:p>
+            <a:pPr algn="ctr">
+              <a:lnSpc>
+                <a:spcPts val="2520"/>
+              </a:lnSpc>
+            </a:pPr>
+            <a:r>
+              <a:rPr lang="en-US" sz="1800" spc="89">
+                <a:solidFill>
+                  <a:srgbClr val="1C3879"/>
+                </a:solidFill>
+                <a:latin typeface="Aileron"/>
+              </a:rPr>
+              <a:t>Khuat Bao Nguyen</a:t>
+            </a:r>
+          </a:p>
+        </p:txBody>
+      </p:sp>
     </p:spTree>
   </p:cSld>
   <p:clrMapOvr>
@@ -5673,13 +5711,7 @@
       </p:grpSpPr>
       <p:grpSp>
         <p:nvGrpSpPr>
-          <p:cNvPr id="2" name="Group 2">
-            <a:extLst>
-              <a:ext uri="{FF2B5EF4-FFF2-40B4-BE49-F238E27FC236}">
-                <a16:creationId xmlns:a16="http://schemas.microsoft.com/office/drawing/2014/main" id="{B89B924C-18F6-76E9-6165-10BB0911596E}"/>
-              </a:ext>
-            </a:extLst>
-          </p:cNvPr>
+          <p:cNvPr id="2" name="Group 2"/>
           <p:cNvGrpSpPr/>
           <p:nvPr/>
         </p:nvGrpSpPr>
@@ -5693,13 +5725,7 @@
         </p:grpSpPr>
         <p:sp>
           <p:nvSpPr>
-            <p:cNvPr id="3" name="Freeform 3">
-              <a:extLst>
-                <a:ext uri="{FF2B5EF4-FFF2-40B4-BE49-F238E27FC236}">
-                  <a16:creationId xmlns:a16="http://schemas.microsoft.com/office/drawing/2014/main" id="{290C0299-5444-4262-D5DE-B54B9C0250C6}"/>
-                </a:ext>
-              </a:extLst>
-            </p:cNvPr>
+            <p:cNvPr id="3" name="Freeform 3"/>
             <p:cNvSpPr/>
             <p:nvPr/>
           </p:nvSpPr>
@@ -5777,13 +5803,7 @@
         </p:sp>
         <p:sp>
           <p:nvSpPr>
-            <p:cNvPr id="4" name="TextBox 4">
-              <a:extLst>
-                <a:ext uri="{FF2B5EF4-FFF2-40B4-BE49-F238E27FC236}">
-                  <a16:creationId xmlns:a16="http://schemas.microsoft.com/office/drawing/2014/main" id="{A8D817F7-83F8-6C11-753E-240DFFACDC1B}"/>
-                </a:ext>
-              </a:extLst>
-            </p:cNvPr>
+            <p:cNvPr id="4" name="TextBox 4"/>
             <p:cNvSpPr txBox="1"/>
             <p:nvPr/>
           </p:nvSpPr>
@@ -5812,13 +5832,7 @@
       </p:grpSp>
       <p:grpSp>
         <p:nvGrpSpPr>
-          <p:cNvPr id="5" name="Group 5">
-            <a:extLst>
-              <a:ext uri="{FF2B5EF4-FFF2-40B4-BE49-F238E27FC236}">
-                <a16:creationId xmlns:a16="http://schemas.microsoft.com/office/drawing/2014/main" id="{4D493E8C-A604-7DAE-AA47-AA8205DDA31E}"/>
-              </a:ext>
-            </a:extLst>
-          </p:cNvPr>
+          <p:cNvPr id="5" name="Group 5"/>
           <p:cNvGrpSpPr/>
           <p:nvPr/>
         </p:nvGrpSpPr>
@@ -5832,13 +5846,7 @@
         </p:grpSpPr>
         <p:sp>
           <p:nvSpPr>
-            <p:cNvPr id="6" name="Freeform 6">
-              <a:extLst>
-                <a:ext uri="{FF2B5EF4-FFF2-40B4-BE49-F238E27FC236}">
-                  <a16:creationId xmlns:a16="http://schemas.microsoft.com/office/drawing/2014/main" id="{354C70C2-8DFB-ABE4-EC24-EA5B4D80CCE3}"/>
-                </a:ext>
-              </a:extLst>
-            </p:cNvPr>
+            <p:cNvPr id="6" name="Freeform 6"/>
             <p:cNvSpPr/>
             <p:nvPr/>
           </p:nvSpPr>
@@ -5892,13 +5900,7 @@
         </p:sp>
         <p:sp>
           <p:nvSpPr>
-            <p:cNvPr id="7" name="TextBox 7">
-              <a:extLst>
-                <a:ext uri="{FF2B5EF4-FFF2-40B4-BE49-F238E27FC236}">
-                  <a16:creationId xmlns:a16="http://schemas.microsoft.com/office/drawing/2014/main" id="{47124AA2-8BE6-7177-6667-99D0207BFF76}"/>
-                </a:ext>
-              </a:extLst>
-            </p:cNvPr>
+            <p:cNvPr id="7" name="TextBox 7"/>
             <p:cNvSpPr txBox="1"/>
             <p:nvPr/>
           </p:nvSpPr>
@@ -5927,13 +5929,7 @@
       </p:grpSp>
       <p:sp>
         <p:nvSpPr>
-          <p:cNvPr id="8" name="Freeform 8">
-            <a:extLst>
-              <a:ext uri="{FF2B5EF4-FFF2-40B4-BE49-F238E27FC236}">
-                <a16:creationId xmlns:a16="http://schemas.microsoft.com/office/drawing/2014/main" id="{887F1779-853B-68D6-8C5A-028533D6922B}"/>
-              </a:ext>
-            </a:extLst>
-          </p:cNvPr>
+          <p:cNvPr id="8" name="Freeform 8"/>
           <p:cNvSpPr/>
           <p:nvPr/>
         </p:nvSpPr>
@@ -5985,13 +5981,7 @@
       </p:sp>
       <p:grpSp>
         <p:nvGrpSpPr>
-          <p:cNvPr id="9" name="Group 9">
-            <a:extLst>
-              <a:ext uri="{FF2B5EF4-FFF2-40B4-BE49-F238E27FC236}">
-                <a16:creationId xmlns:a16="http://schemas.microsoft.com/office/drawing/2014/main" id="{BD3F4133-7AAA-FF93-8C31-5D63D229EC7C}"/>
-              </a:ext>
-            </a:extLst>
-          </p:cNvPr>
+          <p:cNvPr id="9" name="Group 9"/>
           <p:cNvGrpSpPr/>
           <p:nvPr/>
         </p:nvGrpSpPr>
@@ -6005,13 +5995,7 @@
         </p:grpSpPr>
         <p:sp>
           <p:nvSpPr>
-            <p:cNvPr id="10" name="Freeform 10">
-              <a:extLst>
-                <a:ext uri="{FF2B5EF4-FFF2-40B4-BE49-F238E27FC236}">
-                  <a16:creationId xmlns:a16="http://schemas.microsoft.com/office/drawing/2014/main" id="{04F4BCA8-AD22-81F1-9DB8-6D27929DE3B7}"/>
-                </a:ext>
-              </a:extLst>
-            </p:cNvPr>
+            <p:cNvPr id="10" name="Freeform 10"/>
             <p:cNvSpPr/>
             <p:nvPr/>
           </p:nvSpPr>
@@ -6089,13 +6073,7 @@
         </p:sp>
         <p:sp>
           <p:nvSpPr>
-            <p:cNvPr id="11" name="TextBox 11">
-              <a:extLst>
-                <a:ext uri="{FF2B5EF4-FFF2-40B4-BE49-F238E27FC236}">
-                  <a16:creationId xmlns:a16="http://schemas.microsoft.com/office/drawing/2014/main" id="{F67A3F9A-A6EE-74E0-84D7-147BC0CEE222}"/>
-                </a:ext>
-              </a:extLst>
-            </p:cNvPr>
+            <p:cNvPr id="11" name="TextBox 11"/>
             <p:cNvSpPr txBox="1"/>
             <p:nvPr/>
           </p:nvSpPr>
@@ -6124,13 +6102,7 @@
       </p:grpSp>
       <p:grpSp>
         <p:nvGrpSpPr>
-          <p:cNvPr id="12" name="Group 12">
-            <a:extLst>
-              <a:ext uri="{FF2B5EF4-FFF2-40B4-BE49-F238E27FC236}">
-                <a16:creationId xmlns:a16="http://schemas.microsoft.com/office/drawing/2014/main" id="{AB11C1B9-23F3-BD86-50A3-6AC63F660CD4}"/>
-              </a:ext>
-            </a:extLst>
-          </p:cNvPr>
+          <p:cNvPr id="12" name="Group 12"/>
           <p:cNvGrpSpPr/>
           <p:nvPr/>
         </p:nvGrpSpPr>
@@ -6144,13 +6116,7 @@
         </p:grpSpPr>
         <p:sp>
           <p:nvSpPr>
-            <p:cNvPr id="13" name="Freeform 13">
-              <a:extLst>
-                <a:ext uri="{FF2B5EF4-FFF2-40B4-BE49-F238E27FC236}">
-                  <a16:creationId xmlns:a16="http://schemas.microsoft.com/office/drawing/2014/main" id="{BDE5512B-C476-2EE8-1B7C-620F597448FB}"/>
-                </a:ext>
-              </a:extLst>
-            </p:cNvPr>
+            <p:cNvPr id="13" name="Freeform 13"/>
             <p:cNvSpPr/>
             <p:nvPr/>
           </p:nvSpPr>
@@ -6228,13 +6194,7 @@
         </p:sp>
         <p:sp>
           <p:nvSpPr>
-            <p:cNvPr id="14" name="TextBox 14">
-              <a:extLst>
-                <a:ext uri="{FF2B5EF4-FFF2-40B4-BE49-F238E27FC236}">
-                  <a16:creationId xmlns:a16="http://schemas.microsoft.com/office/drawing/2014/main" id="{6240DDD1-5B4B-D6CA-53AD-3C3874E1B14A}"/>
-                </a:ext>
-              </a:extLst>
-            </p:cNvPr>
+            <p:cNvPr id="14" name="TextBox 14"/>
             <p:cNvSpPr txBox="1"/>
             <p:nvPr/>
           </p:nvSpPr>
@@ -6263,13 +6223,7 @@
       </p:grpSp>
       <p:sp>
         <p:nvSpPr>
-          <p:cNvPr id="15" name="TextBox 15">
-            <a:extLst>
-              <a:ext uri="{FF2B5EF4-FFF2-40B4-BE49-F238E27FC236}">
-                <a16:creationId xmlns:a16="http://schemas.microsoft.com/office/drawing/2014/main" id="{CDCA4FD0-FC4A-0659-0725-FD414592B94F}"/>
-              </a:ext>
-            </a:extLst>
-          </p:cNvPr>
+          <p:cNvPr id="15" name="TextBox 15"/>
           <p:cNvSpPr txBox="1"/>
           <p:nvPr/>
         </p:nvSpPr>
@@ -6307,13 +6261,7 @@
       </p:sp>
       <p:sp>
         <p:nvSpPr>
-          <p:cNvPr id="16" name="TextBox 16">
-            <a:extLst>
-              <a:ext uri="{FF2B5EF4-FFF2-40B4-BE49-F238E27FC236}">
-                <a16:creationId xmlns:a16="http://schemas.microsoft.com/office/drawing/2014/main" id="{3A8E0AFD-4665-35DC-4F8C-32BFE1C09C4D}"/>
-              </a:ext>
-            </a:extLst>
-          </p:cNvPr>
+          <p:cNvPr id="16" name="TextBox 16"/>
           <p:cNvSpPr txBox="1"/>
           <p:nvPr/>
         </p:nvSpPr>
@@ -6338,7 +6286,7 @@
               </a:lnSpc>
             </a:pPr>
             <a:r>
-              <a:rPr lang="en-US" sz="1800">
+              <a:rPr lang="en-US" sz="1800" dirty="0">
                 <a:solidFill>
                   <a:srgbClr val="FFFFFF"/>
                 </a:solidFill>
@@ -6351,13 +6299,7 @@
       </p:sp>
       <p:sp>
         <p:nvSpPr>
-          <p:cNvPr id="17" name="TextBox 17">
-            <a:extLst>
-              <a:ext uri="{FF2B5EF4-FFF2-40B4-BE49-F238E27FC236}">
-                <a16:creationId xmlns:a16="http://schemas.microsoft.com/office/drawing/2014/main" id="{79751E95-6927-B873-71F1-9F383CE40072}"/>
-              </a:ext>
-            </a:extLst>
-          </p:cNvPr>
+          <p:cNvPr id="17" name="TextBox 17"/>
           <p:cNvSpPr txBox="1"/>
           <p:nvPr/>
         </p:nvSpPr>
@@ -6395,13 +6337,7 @@
       </p:sp>
       <p:sp>
         <p:nvSpPr>
-          <p:cNvPr id="18" name="TextBox 18">
-            <a:extLst>
-              <a:ext uri="{FF2B5EF4-FFF2-40B4-BE49-F238E27FC236}">
-                <a16:creationId xmlns:a16="http://schemas.microsoft.com/office/drawing/2014/main" id="{7922894E-E2B5-489C-DF8F-2A7B094DF5A5}"/>
-              </a:ext>
-            </a:extLst>
-          </p:cNvPr>
+          <p:cNvPr id="18" name="TextBox 18"/>
           <p:cNvSpPr txBox="1"/>
           <p:nvPr/>
         </p:nvSpPr>
@@ -6439,13 +6375,7 @@
       </p:sp>
       <p:sp>
         <p:nvSpPr>
-          <p:cNvPr id="19" name="TextBox 19">
-            <a:extLst>
-              <a:ext uri="{FF2B5EF4-FFF2-40B4-BE49-F238E27FC236}">
-                <a16:creationId xmlns:a16="http://schemas.microsoft.com/office/drawing/2014/main" id="{B09CB97B-0C08-D083-3694-C25106354DF8}"/>
-              </a:ext>
-            </a:extLst>
-          </p:cNvPr>
+          <p:cNvPr id="19" name="TextBox 19"/>
           <p:cNvSpPr txBox="1"/>
           <p:nvPr/>
         </p:nvSpPr>
@@ -6483,13 +6413,7 @@
       </p:sp>
       <p:sp>
         <p:nvSpPr>
-          <p:cNvPr id="20" name="TextBox 20">
-            <a:extLst>
-              <a:ext uri="{FF2B5EF4-FFF2-40B4-BE49-F238E27FC236}">
-                <a16:creationId xmlns:a16="http://schemas.microsoft.com/office/drawing/2014/main" id="{176225B1-B476-6829-458C-48B5F6E7E940}"/>
-              </a:ext>
-            </a:extLst>
-          </p:cNvPr>
+          <p:cNvPr id="20" name="TextBox 20"/>
           <p:cNvSpPr txBox="1"/>
           <p:nvPr/>
         </p:nvSpPr>
@@ -6527,10 +6451,10 @@
       </p:sp>
       <p:pic>
         <p:nvPicPr>
-          <p:cNvPr id="21" name="Picture 20">
+          <p:cNvPr id="22" name="Picture 21">
             <a:extLst>
               <a:ext uri="{FF2B5EF4-FFF2-40B4-BE49-F238E27FC236}">
-                <a16:creationId xmlns:a16="http://schemas.microsoft.com/office/drawing/2014/main" id="{8E969C73-AB7C-942F-166D-091A0A8A1BDF}"/>
+                <a16:creationId xmlns:a16="http://schemas.microsoft.com/office/drawing/2014/main" id="{E1A79411-2899-2BD0-5B25-65A68A99D183}"/>
               </a:ext>
             </a:extLst>
           </p:cNvPr>
@@ -6547,8 +6471,8 @@
         </p:blipFill>
         <p:spPr>
           <a:xfrm>
-            <a:off x="6000210" y="4398010"/>
-            <a:ext cx="1352739" cy="1171739"/>
+            <a:off x="5985921" y="4459211"/>
+            <a:ext cx="1381318" cy="1200318"/>
           </a:xfrm>
           <a:prstGeom prst="rect">
             <a:avLst/>
@@ -6557,10 +6481,10 @@
       </p:pic>
       <p:pic>
         <p:nvPicPr>
-          <p:cNvPr id="22" name="Picture 21">
+          <p:cNvPr id="24" name="Picture 23">
             <a:extLst>
               <a:ext uri="{FF2B5EF4-FFF2-40B4-BE49-F238E27FC236}">
-                <a16:creationId xmlns:a16="http://schemas.microsoft.com/office/drawing/2014/main" id="{5D3AD2F2-D625-A818-D040-17E7950A93B7}"/>
+                <a16:creationId xmlns:a16="http://schemas.microsoft.com/office/drawing/2014/main" id="{332B524C-68E8-F8EF-2C45-F37BE71B5C2E}"/>
               </a:ext>
             </a:extLst>
           </p:cNvPr>
@@ -6577,8 +6501,8 @@
         </p:blipFill>
         <p:spPr>
           <a:xfrm>
-            <a:off x="11049000" y="4497317"/>
-            <a:ext cx="1352739" cy="1162212"/>
+            <a:off x="10910567" y="4533858"/>
+            <a:ext cx="1390844" cy="1114581"/>
           </a:xfrm>
           <a:prstGeom prst="rect">
             <a:avLst/>
@@ -6586,11 +6510,6 @@
         </p:spPr>
       </p:pic>
     </p:spTree>
-    <p:extLst>
-      <p:ext uri="{BB962C8B-B14F-4D97-AF65-F5344CB8AC3E}">
-        <p14:creationId xmlns:p14="http://schemas.microsoft.com/office/powerpoint/2010/main" val="1434391837"/>
-      </p:ext>
-    </p:extLst>
   </p:cSld>
   <p:clrMapOvr>
     <a:masterClrMapping/>

</xml_diff>